<commit_message>
project proposal and pptx slide 8 updated
</commit_message>
<xml_diff>
--- a/Project Presentation/Predicting Dementia-06-08-24-1.25pm.pptx
+++ b/Project Presentation/Predicting Dementia-06-08-24-1.25pm.pptx
@@ -18224,7 +18224,7 @@
                         <a:defRPr/>
                       </a:pPr>
                       <a:r>
-                        <a:rPr lang="en-US" sz="1899">
+                        <a:rPr lang="en-US" sz="1899" dirty="0">
                           <a:solidFill>
                             <a:srgbClr val="156669"/>
                           </a:solidFill>
@@ -18235,7 +18235,7 @@
                         </a:rPr>
                         <a:t>dense_2 (Dense)</a:t>
                       </a:r>
-                      <a:endParaRPr lang="en-US" sz="1100"/>
+                      <a:endParaRPr lang="en-US" sz="1100" dirty="0"/>
                     </a:p>
                   </a:txBody>
                   <a:tcPr marL="190500" marR="190500" marT="190500" marB="190500" anchor="ctr">
@@ -18360,7 +18360,7 @@
                         <a:defRPr/>
                       </a:pPr>
                       <a:r>
-                        <a:rPr lang="en-US" sz="1899">
+                        <a:rPr lang="en-US" sz="1899" dirty="0">
                           <a:solidFill>
                             <a:srgbClr val="156669"/>
                           </a:solidFill>
@@ -18371,7 +18371,7 @@
                         </a:rPr>
                         <a:t>3</a:t>
                       </a:r>
-                      <a:endParaRPr lang="en-US" sz="1100"/>
+                      <a:endParaRPr lang="en-US" sz="1100" dirty="0"/>
                     </a:p>
                   </a:txBody>
                   <a:tcPr marL="190500" marR="190500" marT="190500" marB="190500" anchor="ctr">
@@ -18687,8 +18687,8 @@
         </p:nvSpPr>
         <p:spPr>
           <a:xfrm>
-            <a:off x="13590859" y="2979128"/>
-            <a:ext cx="3203168" cy="1990852"/>
+            <a:off x="13683340" y="2819451"/>
+            <a:ext cx="3203168" cy="2539157"/>
           </a:xfrm>
           <a:prstGeom prst="rect">
             <a:avLst/>
@@ -18706,7 +18706,7 @@
               </a:lnSpc>
             </a:pPr>
             <a:r>
-              <a:rPr lang="en-US" sz="1900">
+              <a:rPr lang="en-US" sz="1900" dirty="0">
                 <a:solidFill>
                   <a:srgbClr val="FFFFFF"/>
                 </a:solidFill>
@@ -18718,7 +18718,7 @@
               <a:t>Optimizer: </a:t>
             </a:r>
             <a:r>
-              <a:rPr lang="en-US" sz="1900">
+              <a:rPr lang="en-US" sz="1900" dirty="0">
                 <a:solidFill>
                   <a:srgbClr val="FFFFFF"/>
                 </a:solidFill>
@@ -18736,8 +18736,24 @@
                 <a:spcPts val="2204"/>
               </a:lnSpc>
             </a:pPr>
+            <a:endParaRPr lang="en-US" sz="1900" dirty="0">
+              <a:solidFill>
+                <a:srgbClr val="FFFFFF"/>
+              </a:solidFill>
+              <a:latin typeface="Agrandir"/>
+              <a:ea typeface="Agrandir"/>
+              <a:cs typeface="Agrandir"/>
+              <a:sym typeface="Agrandir"/>
+            </a:endParaRPr>
+          </a:p>
+          <a:p>
+            <a:pPr algn="l">
+              <a:lnSpc>
+                <a:spcPts val="2204"/>
+              </a:lnSpc>
+            </a:pPr>
             <a:r>
-              <a:rPr lang="en-US" sz="1900">
+              <a:rPr lang="en-US" sz="1900" dirty="0">
                 <a:solidFill>
                   <a:srgbClr val="FFFFFF"/>
                 </a:solidFill>
@@ -18749,7 +18765,7 @@
               <a:t>Loss function:</a:t>
             </a:r>
             <a:r>
-              <a:rPr lang="en-US" sz="1900">
+              <a:rPr lang="en-US" sz="1900" dirty="0">
                 <a:solidFill>
                   <a:srgbClr val="FFFFFF"/>
                 </a:solidFill>
@@ -18761,7 +18777,7 @@
               <a:t> </a:t>
             </a:r>
             <a:r>
-              <a:rPr lang="en-US" sz="1900">
+              <a:rPr lang="en-US" sz="1900" dirty="0" err="1">
                 <a:solidFill>
                   <a:srgbClr val="FFFFFF"/>
                 </a:solidFill>
@@ -18772,6 +18788,31 @@
               </a:rPr>
               <a:t>binary_crossentropy</a:t>
             </a:r>
+            <a:endParaRPr lang="en-US" sz="1900" dirty="0">
+              <a:solidFill>
+                <a:srgbClr val="FFFFFF"/>
+              </a:solidFill>
+              <a:latin typeface="Agrandir"/>
+              <a:ea typeface="Agrandir"/>
+              <a:cs typeface="Agrandir"/>
+              <a:sym typeface="Agrandir"/>
+            </a:endParaRPr>
+          </a:p>
+          <a:p>
+            <a:pPr algn="l">
+              <a:lnSpc>
+                <a:spcPts val="2204"/>
+              </a:lnSpc>
+            </a:pPr>
+            <a:endParaRPr lang="en-US" sz="1900" dirty="0">
+              <a:solidFill>
+                <a:srgbClr val="FFFFFF"/>
+              </a:solidFill>
+              <a:latin typeface="Agrandir"/>
+              <a:ea typeface="Agrandir"/>
+              <a:cs typeface="Agrandir"/>
+              <a:sym typeface="Agrandir"/>
+            </a:endParaRPr>
           </a:p>
           <a:p>
             <a:pPr algn="l">
@@ -18780,7 +18821,7 @@
               </a:lnSpc>
             </a:pPr>
             <a:r>
-              <a:rPr lang="en-US" sz="1900">
+              <a:rPr lang="en-US" sz="1900" dirty="0">
                 <a:solidFill>
                   <a:srgbClr val="FFFFFF"/>
                 </a:solidFill>
@@ -18792,7 +18833,7 @@
               <a:t>Evaluation metrics:</a:t>
             </a:r>
             <a:r>
-              <a:rPr lang="en-US" sz="1900">
+              <a:rPr lang="en-US" sz="1900" dirty="0">
                 <a:solidFill>
                   <a:srgbClr val="FFFFFF"/>
                 </a:solidFill>
@@ -18804,7 +18845,7 @@
               <a:t> </a:t>
             </a:r>
             <a:r>
-              <a:rPr lang="en-US" sz="1900">
+              <a:rPr lang="en-US" sz="1900" dirty="0">
                 <a:solidFill>
                   <a:srgbClr val="FFFFFF"/>
                 </a:solidFill>
@@ -18822,7 +18863,7 @@
                 <a:spcPts val="2204"/>
               </a:lnSpc>
             </a:pPr>
-            <a:endParaRPr lang="en-US" sz="1900">
+            <a:endParaRPr lang="en-US" sz="1900" dirty="0">
               <a:solidFill>
                 <a:srgbClr val="FFFFFF"/>
               </a:solidFill>
@@ -18839,7 +18880,7 @@
               </a:lnSpc>
             </a:pPr>
             <a:r>
-              <a:rPr lang="en-US" sz="1900">
+              <a:rPr lang="en-US" sz="1900" dirty="0" err="1">
                 <a:solidFill>
                   <a:srgbClr val="FFFFFF"/>
                 </a:solidFill>
@@ -18848,10 +18889,22 @@
                 <a:cs typeface="Agrandir Bold"/>
                 <a:sym typeface="Agrandir Bold"/>
               </a:rPr>
-              <a:t>Epocs: </a:t>
+              <a:t>Epocs</a:t>
             </a:r>
             <a:r>
-              <a:rPr lang="en-US" sz="1900">
+              <a:rPr lang="en-US" sz="1900" dirty="0">
+                <a:solidFill>
+                  <a:srgbClr val="FFFFFF"/>
+                </a:solidFill>
+                <a:latin typeface="Agrandir Bold"/>
+                <a:ea typeface="Agrandir Bold"/>
+                <a:cs typeface="Agrandir Bold"/>
+                <a:sym typeface="Agrandir Bold"/>
+              </a:rPr>
+              <a:t>: </a:t>
+            </a:r>
+            <a:r>
+              <a:rPr lang="en-US" sz="1900" dirty="0">
                 <a:solidFill>
                   <a:srgbClr val="FFFFFF"/>
                 </a:solidFill>
@@ -23208,11 +23261,17 @@
           <p:cNvGraphicFramePr>
             <a:graphicFrameLocks noGrp="1"/>
           </p:cNvGraphicFramePr>
-          <p:nvPr/>
+          <p:nvPr>
+            <p:extLst>
+              <p:ext uri="{D42A27DB-BD31-4B8C-83A1-F6EECF244321}">
+                <p14:modId xmlns:p14="http://schemas.microsoft.com/office/powerpoint/2010/main" val="2055602164"/>
+              </p:ext>
+            </p:extLst>
+          </p:nvPr>
         </p:nvGraphicFramePr>
         <p:xfrm>
-          <a:off x="1214703" y="5810123"/>
-          <a:ext cx="15858594" cy="3276600"/>
+          <a:off x="1205501" y="5595039"/>
+          <a:ext cx="15858594" cy="3903489"/>
         </p:xfrm>
         <a:graphic>
           <a:graphicData uri="http://schemas.openxmlformats.org/drawingml/2006/table">
@@ -23241,7 +23300,7 @@
                   </a:extLst>
                 </a:gridCol>
               </a:tblGrid>
-              <a:tr h="819150">
+              <a:tr h="721380">
                 <a:tc>
                   <a:txBody>
                     <a:bodyPr/>
@@ -23322,7 +23381,7 @@
                         <a:defRPr/>
                       </a:pPr>
                       <a:r>
-                        <a:rPr lang="en-US" sz="1899">
+                        <a:rPr lang="en-US" sz="1899" dirty="0">
                           <a:solidFill>
                             <a:srgbClr val="FFFFFF"/>
                           </a:solidFill>
@@ -23333,7 +23392,7 @@
                         </a:rPr>
                         <a:t>Output Shape</a:t>
                       </a:r>
-                      <a:endParaRPr lang="en-US" sz="1100"/>
+                      <a:endParaRPr lang="en-US" sz="1100" dirty="0"/>
                     </a:p>
                   </a:txBody>
                   <a:tcPr marL="190500" marR="190500" marT="190500" marB="190500" anchor="ctr">
@@ -23452,7 +23511,7 @@
                   </a:ext>
                 </a:extLst>
               </a:tr>
-              <a:tr h="819150">
+              <a:tr h="721380">
                 <a:tc>
                   <a:txBody>
                     <a:bodyPr/>
@@ -23533,7 +23592,7 @@
                         <a:defRPr/>
                       </a:pPr>
                       <a:r>
-                        <a:rPr lang="en-US" sz="1899">
+                        <a:rPr lang="en-US" sz="1899" dirty="0">
                           <a:solidFill>
                             <a:srgbClr val="156669"/>
                           </a:solidFill>
@@ -23542,9 +23601,9 @@
                           <a:cs typeface="Open Sans Extra Bold"/>
                           <a:sym typeface="Open Sans Extra Bold"/>
                         </a:rPr>
-                        <a:t>(None, 5)</a:t>
+                        <a:t>(None, 8)</a:t>
                       </a:r>
-                      <a:endParaRPr lang="en-US" sz="1100"/>
+                      <a:endParaRPr lang="en-US" sz="1100" dirty="0"/>
                     </a:p>
                   </a:txBody>
                   <a:tcPr marL="190500" marR="190500" marT="190500" marB="190500" anchor="ctr">
@@ -23601,7 +23660,7 @@
                         <a:defRPr/>
                       </a:pPr>
                       <a:r>
-                        <a:rPr lang="en-US" sz="1899">
+                        <a:rPr lang="en-US" sz="1899" dirty="0">
                           <a:solidFill>
                             <a:srgbClr val="156669"/>
                           </a:solidFill>
@@ -23610,9 +23669,9 @@
                           <a:cs typeface="Open Sans Extra Bold"/>
                           <a:sym typeface="Open Sans Extra Bold"/>
                         </a:rPr>
-                        <a:t>230</a:t>
+                        <a:t>368</a:t>
                       </a:r>
-                      <a:endParaRPr lang="en-US" sz="1100"/>
+                      <a:endParaRPr lang="en-US" sz="1100" dirty="0"/>
                     </a:p>
                   </a:txBody>
                   <a:tcPr marL="190500" marR="190500" marT="190500" marB="190500" anchor="ctr">
@@ -23663,7 +23722,7 @@
                   </a:ext>
                 </a:extLst>
               </a:tr>
-              <a:tr h="819150">
+              <a:tr h="721380">
                 <a:tc>
                   <a:txBody>
                     <a:bodyPr/>
@@ -23744,7 +23803,7 @@
                         <a:defRPr/>
                       </a:pPr>
                       <a:r>
-                        <a:rPr lang="en-US" sz="1899">
+                        <a:rPr lang="en-US" sz="1899" dirty="0">
                           <a:solidFill>
                             <a:srgbClr val="156669"/>
                           </a:solidFill>
@@ -23753,9 +23812,9 @@
                           <a:cs typeface="Open Sans Extra Bold"/>
                           <a:sym typeface="Open Sans Extra Bold"/>
                         </a:rPr>
-                        <a:t>(None, 2)</a:t>
+                        <a:t>(None, 5)</a:t>
                       </a:r>
-                      <a:endParaRPr lang="en-US" sz="1100"/>
+                      <a:endParaRPr lang="en-US" sz="1100" dirty="0"/>
                     </a:p>
                   </a:txBody>
                   <a:tcPr marL="190500" marR="190500" marT="190500" marB="190500" anchor="ctr">
@@ -23812,7 +23871,7 @@
                         <a:defRPr/>
                       </a:pPr>
                       <a:r>
-                        <a:rPr lang="en-US" sz="1899">
+                        <a:rPr lang="en-US" sz="1899" dirty="0">
                           <a:solidFill>
                             <a:srgbClr val="156669"/>
                           </a:solidFill>
@@ -23821,9 +23880,9 @@
                           <a:cs typeface="Open Sans Extra Bold"/>
                           <a:sym typeface="Open Sans Extra Bold"/>
                         </a:rPr>
-                        <a:t>12</a:t>
+                        <a:t>45</a:t>
                       </a:r>
-                      <a:endParaRPr lang="en-US" sz="1100"/>
+                      <a:endParaRPr lang="en-US" sz="1100" dirty="0"/>
                     </a:p>
                   </a:txBody>
                   <a:tcPr marL="190500" marR="190500" marT="190500" marB="190500" anchor="ctr">
@@ -23874,7 +23933,7 @@
                   </a:ext>
                 </a:extLst>
               </a:tr>
-              <a:tr h="819150">
+              <a:tr h="721380">
                 <a:tc>
                   <a:txBody>
                     <a:bodyPr/>
@@ -23887,7 +23946,7 @@
                         <a:defRPr/>
                       </a:pPr>
                       <a:r>
-                        <a:rPr lang="en-US" sz="1899">
+                        <a:rPr lang="en-US" sz="1899" dirty="0">
                           <a:solidFill>
                             <a:srgbClr val="156669"/>
                           </a:solidFill>
@@ -23898,7 +23957,7 @@
                         </a:rPr>
                         <a:t>dense_2 (Dense)</a:t>
                       </a:r>
-                      <a:endParaRPr lang="en-US" sz="1100"/>
+                      <a:endParaRPr lang="en-US" sz="1100" dirty="0"/>
                     </a:p>
                   </a:txBody>
                   <a:tcPr marL="190500" marR="190500" marT="190500" marB="190500" anchor="ctr">
@@ -23955,7 +24014,7 @@
                         <a:defRPr/>
                       </a:pPr>
                       <a:r>
-                        <a:rPr lang="en-US" sz="1899">
+                        <a:rPr lang="en-US" sz="1899" dirty="0">
                           <a:solidFill>
                             <a:srgbClr val="156669"/>
                           </a:solidFill>
@@ -23964,9 +24023,9 @@
                           <a:cs typeface="Open Sans Extra Bold"/>
                           <a:sym typeface="Open Sans Extra Bold"/>
                         </a:rPr>
-                        <a:t>(None, 1)</a:t>
+                        <a:t>(None, 2)</a:t>
                       </a:r>
-                      <a:endParaRPr lang="en-US" sz="1100"/>
+                      <a:endParaRPr lang="en-US" sz="1100" dirty="0"/>
                     </a:p>
                   </a:txBody>
                   <a:tcPr marL="190500" marR="190500" marT="190500" marB="190500" anchor="ctr">
@@ -24023,7 +24082,271 @@
                         <a:defRPr/>
                       </a:pPr>
                       <a:r>
-                        <a:rPr lang="en-US" sz="1899">
+                        <a:rPr lang="en-US" sz="1899" dirty="0">
+                          <a:solidFill>
+                            <a:srgbClr val="156669"/>
+                          </a:solidFill>
+                          <a:latin typeface="Open Sans Extra Bold"/>
+                          <a:ea typeface="Open Sans Extra Bold"/>
+                          <a:cs typeface="Open Sans Extra Bold"/>
+                          <a:sym typeface="Open Sans Extra Bold"/>
+                        </a:rPr>
+                        <a:t>12</a:t>
+                      </a:r>
+                    </a:p>
+                  </a:txBody>
+                  <a:tcPr marL="190500" marR="190500" marT="190500" marB="190500" anchor="ctr">
+                    <a:lnL w="38100" cap="flat" cmpd="sng" algn="ctr">
+                      <a:solidFill>
+                        <a:srgbClr val="156669"/>
+                      </a:solidFill>
+                      <a:prstDash val="solid"/>
+                      <a:round/>
+                      <a:headEnd type="none" w="med" len="med"/>
+                      <a:tailEnd type="none" w="med" len="med"/>
+                    </a:lnL>
+                    <a:lnR w="38100" cap="flat" cmpd="sng" algn="ctr">
+                      <a:solidFill>
+                        <a:srgbClr val="156669"/>
+                      </a:solidFill>
+                      <a:prstDash val="solid"/>
+                      <a:round/>
+                      <a:headEnd type="none" w="med" len="med"/>
+                      <a:tailEnd type="none" w="med" len="med"/>
+                    </a:lnR>
+                    <a:lnT w="38100" cap="flat" cmpd="sng" algn="ctr">
+                      <a:solidFill>
+                        <a:srgbClr val="156669"/>
+                      </a:solidFill>
+                      <a:prstDash val="solid"/>
+                      <a:round/>
+                      <a:headEnd type="none" w="med" len="med"/>
+                      <a:tailEnd type="none" w="med" len="med"/>
+                    </a:lnT>
+                    <a:lnB w="38100" cap="flat" cmpd="sng" algn="ctr">
+                      <a:solidFill>
+                        <a:srgbClr val="156669"/>
+                      </a:solidFill>
+                      <a:prstDash val="solid"/>
+                      <a:round/>
+                      <a:headEnd type="none" w="med" len="med"/>
+                      <a:tailEnd type="none" w="med" len="med"/>
+                    </a:lnB>
+                    <a:solidFill>
+                      <a:srgbClr val="FDFDFD"/>
+                    </a:solidFill>
+                  </a:tcPr>
+                </a:tc>
+                <a:extLst>
+                  <a:ext uri="{0D108BD9-81ED-4DB2-BD59-A6C34878D82A}">
+                    <a16:rowId xmlns:a16="http://schemas.microsoft.com/office/drawing/2014/main" val="10003"/>
+                  </a:ext>
+                </a:extLst>
+              </a:tr>
+              <a:tr h="970234">
+                <a:tc>
+                  <a:txBody>
+                    <a:bodyPr/>
+                    <a:lstStyle/>
+                    <a:p>
+                      <a:pPr marL="0" marR="0" lvl="0" indent="0" algn="ctr" defTabSz="914400" rtl="0" eaLnBrk="1" fontAlgn="auto" latinLnBrk="0" hangingPunct="1">
+                        <a:lnSpc>
+                          <a:spcPts val="2659"/>
+                        </a:lnSpc>
+                        <a:spcBef>
+                          <a:spcPts val="0"/>
+                        </a:spcBef>
+                        <a:spcAft>
+                          <a:spcPts val="0"/>
+                        </a:spcAft>
+                        <a:buClrTx/>
+                        <a:buSzTx/>
+                        <a:buFontTx/>
+                        <a:buNone/>
+                        <a:tabLst/>
+                        <a:defRPr/>
+                      </a:pPr>
+                      <a:r>
+                        <a:rPr lang="en-US" sz="1899" kern="1200" dirty="0">
+                          <a:solidFill>
+                            <a:srgbClr val="156669"/>
+                          </a:solidFill>
+                          <a:latin typeface="Open Sans Extra Bold"/>
+                          <a:ea typeface="Open Sans Extra Bold"/>
+                          <a:cs typeface="Open Sans Extra Bold"/>
+                          <a:sym typeface="Open Sans Extra Bold"/>
+                        </a:rPr>
+                        <a:t>dense_3 (Dense)</a:t>
+                      </a:r>
+                      <a:endParaRPr lang="en-US" sz="1899" kern="1200" dirty="0">
+                        <a:solidFill>
+                          <a:srgbClr val="156669"/>
+                        </a:solidFill>
+                        <a:latin typeface="Open Sans Extra Bold"/>
+                        <a:ea typeface="Open Sans Extra Bold"/>
+                        <a:cs typeface="Open Sans Extra Bold"/>
+                      </a:endParaRPr>
+                    </a:p>
+                    <a:p>
+                      <a:pPr algn="ctr">
+                        <a:lnSpc>
+                          <a:spcPts val="2659"/>
+                        </a:lnSpc>
+                        <a:defRPr/>
+                      </a:pPr>
+                      <a:endParaRPr lang="en-US" sz="1100" dirty="0"/>
+                    </a:p>
+                  </a:txBody>
+                  <a:tcPr marL="190500" marR="190500" marT="190500" marB="190500" anchor="ctr">
+                    <a:lnL w="38100" cap="flat" cmpd="sng" algn="ctr">
+                      <a:solidFill>
+                        <a:srgbClr val="156669"/>
+                      </a:solidFill>
+                      <a:prstDash val="solid"/>
+                      <a:round/>
+                      <a:headEnd type="none" w="med" len="med"/>
+                      <a:tailEnd type="none" w="med" len="med"/>
+                    </a:lnL>
+                    <a:lnR w="38100" cap="flat" cmpd="sng" algn="ctr">
+                      <a:solidFill>
+                        <a:srgbClr val="156669"/>
+                      </a:solidFill>
+                      <a:prstDash val="solid"/>
+                      <a:round/>
+                      <a:headEnd type="none" w="med" len="med"/>
+                      <a:tailEnd type="none" w="med" len="med"/>
+                    </a:lnR>
+                    <a:lnT w="38100" cap="flat" cmpd="sng" algn="ctr">
+                      <a:solidFill>
+                        <a:srgbClr val="156669"/>
+                      </a:solidFill>
+                      <a:prstDash val="solid"/>
+                      <a:round/>
+                      <a:headEnd type="none" w="med" len="med"/>
+                      <a:tailEnd type="none" w="med" len="med"/>
+                    </a:lnT>
+                    <a:lnB w="38100" cap="flat" cmpd="sng" algn="ctr">
+                      <a:solidFill>
+                        <a:srgbClr val="156669"/>
+                      </a:solidFill>
+                      <a:prstDash val="solid"/>
+                      <a:round/>
+                      <a:headEnd type="none" w="med" len="med"/>
+                      <a:tailEnd type="none" w="med" len="med"/>
+                    </a:lnB>
+                    <a:solidFill>
+                      <a:srgbClr val="FDFDFD"/>
+                    </a:solidFill>
+                  </a:tcPr>
+                </a:tc>
+                <a:tc>
+                  <a:txBody>
+                    <a:bodyPr/>
+                    <a:lstStyle/>
+                    <a:p>
+                      <a:pPr marL="0" marR="0" lvl="0" indent="0" algn="ctr" defTabSz="914400" rtl="0" eaLnBrk="1" fontAlgn="auto" latinLnBrk="0" hangingPunct="1">
+                        <a:lnSpc>
+                          <a:spcPts val="2659"/>
+                        </a:lnSpc>
+                        <a:spcBef>
+                          <a:spcPts val="0"/>
+                        </a:spcBef>
+                        <a:spcAft>
+                          <a:spcPts val="0"/>
+                        </a:spcAft>
+                        <a:buClrTx/>
+                        <a:buSzTx/>
+                        <a:buFontTx/>
+                        <a:buNone/>
+                        <a:tabLst/>
+                        <a:defRPr/>
+                      </a:pPr>
+                      <a:r>
+                        <a:rPr lang="en-US" sz="1899" kern="1200" dirty="0">
+                          <a:solidFill>
+                            <a:srgbClr val="156669"/>
+                          </a:solidFill>
+                          <a:latin typeface="Open Sans Extra Bold"/>
+                          <a:ea typeface="Open Sans Extra Bold"/>
+                          <a:cs typeface="Open Sans Extra Bold"/>
+                          <a:sym typeface="Open Sans Extra Bold"/>
+                        </a:rPr>
+                        <a:t>(None, 1)</a:t>
+                      </a:r>
+                      <a:endParaRPr lang="en-US" sz="1899" kern="1200" dirty="0">
+                        <a:solidFill>
+                          <a:srgbClr val="156669"/>
+                        </a:solidFill>
+                        <a:latin typeface="Open Sans Extra Bold"/>
+                        <a:ea typeface="Open Sans Extra Bold"/>
+                        <a:cs typeface="Open Sans Extra Bold"/>
+                      </a:endParaRPr>
+                    </a:p>
+                    <a:p>
+                      <a:pPr algn="ctr">
+                        <a:lnSpc>
+                          <a:spcPts val="2659"/>
+                        </a:lnSpc>
+                        <a:defRPr/>
+                      </a:pPr>
+                      <a:endParaRPr lang="en-US" sz="1100" dirty="0"/>
+                    </a:p>
+                  </a:txBody>
+                  <a:tcPr marL="190500" marR="190500" marT="190500" marB="190500" anchor="ctr">
+                    <a:lnL w="38100" cap="flat" cmpd="sng" algn="ctr">
+                      <a:solidFill>
+                        <a:srgbClr val="156669"/>
+                      </a:solidFill>
+                      <a:prstDash val="solid"/>
+                      <a:round/>
+                      <a:headEnd type="none" w="med" len="med"/>
+                      <a:tailEnd type="none" w="med" len="med"/>
+                    </a:lnL>
+                    <a:lnR w="38100" cap="flat" cmpd="sng" algn="ctr">
+                      <a:solidFill>
+                        <a:srgbClr val="156669"/>
+                      </a:solidFill>
+                      <a:prstDash val="solid"/>
+                      <a:round/>
+                      <a:headEnd type="none" w="med" len="med"/>
+                      <a:tailEnd type="none" w="med" len="med"/>
+                    </a:lnR>
+                    <a:lnT w="38100" cap="flat" cmpd="sng" algn="ctr">
+                      <a:solidFill>
+                        <a:srgbClr val="156669"/>
+                      </a:solidFill>
+                      <a:prstDash val="solid"/>
+                      <a:round/>
+                      <a:headEnd type="none" w="med" len="med"/>
+                      <a:tailEnd type="none" w="med" len="med"/>
+                    </a:lnT>
+                    <a:lnB w="38100" cap="flat" cmpd="sng" algn="ctr">
+                      <a:solidFill>
+                        <a:srgbClr val="156669"/>
+                      </a:solidFill>
+                      <a:prstDash val="solid"/>
+                      <a:round/>
+                      <a:headEnd type="none" w="med" len="med"/>
+                      <a:tailEnd type="none" w="med" len="med"/>
+                    </a:lnB>
+                    <a:solidFill>
+                      <a:srgbClr val="FDFDFD"/>
+                    </a:solidFill>
+                  </a:tcPr>
+                </a:tc>
+                <a:tc>
+                  <a:txBody>
+                    <a:bodyPr/>
+                    <a:lstStyle/>
+                    <a:p>
+                      <a:pPr algn="ctr">
+                        <a:lnSpc>
+                          <a:spcPts val="2659"/>
+                        </a:lnSpc>
+                        <a:defRPr/>
+                      </a:pPr>
+                      <a:r>
+                        <a:rPr lang="en-US" sz="1899" dirty="0">
                           <a:solidFill>
                             <a:srgbClr val="156669"/>
                           </a:solidFill>
@@ -24034,7 +24357,6 @@
                         </a:rPr>
                         <a:t>3</a:t>
                       </a:r>
-                      <a:endParaRPr lang="en-US" sz="1100"/>
                     </a:p>
                   </a:txBody>
                   <a:tcPr marL="190500" marR="190500" marT="190500" marB="190500" anchor="ctr">
@@ -24081,7 +24403,7 @@
                 </a:tc>
                 <a:extLst>
                   <a:ext uri="{0D108BD9-81ED-4DB2-BD59-A6C34878D82A}">
-                    <a16:rowId xmlns:a16="http://schemas.microsoft.com/office/drawing/2014/main" val="10003"/>
+                    <a16:rowId xmlns:a16="http://schemas.microsoft.com/office/drawing/2014/main" val="2459316827"/>
                   </a:ext>
                 </a:extLst>
               </a:tr>
@@ -24097,7 +24419,7 @@
         </p:nvGrpSpPr>
         <p:grpSpPr>
           <a:xfrm>
-            <a:off x="14099815" y="2509928"/>
+            <a:off x="14069535" y="2470376"/>
             <a:ext cx="2973482" cy="2976877"/>
             <a:chOff x="0" y="0"/>
             <a:chExt cx="927352" cy="928411"/>
@@ -24294,8 +24616,8 @@
         </p:nvSpPr>
         <p:spPr>
           <a:xfrm>
-            <a:off x="1214703" y="9210548"/>
-            <a:ext cx="4948510" cy="333502"/>
+            <a:off x="1223428" y="9794099"/>
+            <a:ext cx="4948510" cy="282129"/>
           </a:xfrm>
           <a:prstGeom prst="rect">
             <a:avLst/>
@@ -24313,7 +24635,7 @@
               </a:lnSpc>
             </a:pPr>
             <a:r>
-              <a:rPr lang="en-US" sz="1900">
+              <a:rPr lang="en-US" sz="1900" dirty="0">
                 <a:solidFill>
                   <a:srgbClr val="156669"/>
                 </a:solidFill>
@@ -24322,7 +24644,7 @@
                 <a:cs typeface="Agrandir"/>
                 <a:sym typeface="Agrandir"/>
               </a:rPr>
-              <a:t>Total params: 245 (980.00 B)</a:t>
+              <a:t>Total params: 428 (1.67 KB)</a:t>
             </a:r>
           </a:p>
         </p:txBody>
@@ -24335,8 +24657,8 @@
         </p:nvSpPr>
         <p:spPr>
           <a:xfrm>
-            <a:off x="14404615" y="2979128"/>
-            <a:ext cx="2389412" cy="1990852"/>
+            <a:off x="14452284" y="2613913"/>
+            <a:ext cx="2389412" cy="2539157"/>
           </a:xfrm>
           <a:prstGeom prst="rect">
             <a:avLst/>
@@ -24354,7 +24676,7 @@
               </a:lnSpc>
             </a:pPr>
             <a:r>
-              <a:rPr lang="en-US" sz="1900">
+              <a:rPr lang="en-US" sz="1900" dirty="0">
                 <a:solidFill>
                   <a:srgbClr val="FFFFFF"/>
                 </a:solidFill>
@@ -24366,7 +24688,7 @@
               <a:t>Optimizer: </a:t>
             </a:r>
             <a:r>
-              <a:rPr lang="en-US" sz="1900">
+              <a:rPr lang="en-US" sz="1900" dirty="0">
                 <a:solidFill>
                   <a:srgbClr val="FFFFFF"/>
                 </a:solidFill>
@@ -24384,8 +24706,24 @@
                 <a:spcPts val="2204"/>
               </a:lnSpc>
             </a:pPr>
+            <a:endParaRPr lang="en-US" sz="1900" dirty="0">
+              <a:solidFill>
+                <a:srgbClr val="FFFFFF"/>
+              </a:solidFill>
+              <a:latin typeface="Agrandir Bold"/>
+              <a:ea typeface="Agrandir Bold"/>
+              <a:cs typeface="Agrandir Bold"/>
+              <a:sym typeface="Agrandir Bold"/>
+            </a:endParaRPr>
+          </a:p>
+          <a:p>
+            <a:pPr algn="l">
+              <a:lnSpc>
+                <a:spcPts val="2204"/>
+              </a:lnSpc>
+            </a:pPr>
             <a:r>
-              <a:rPr lang="en-US" sz="1900">
+              <a:rPr lang="en-US" sz="1900" dirty="0">
                 <a:solidFill>
                   <a:srgbClr val="FFFFFF"/>
                 </a:solidFill>
@@ -24397,7 +24735,7 @@
               <a:t>Loss function:</a:t>
             </a:r>
             <a:r>
-              <a:rPr lang="en-US" sz="1900">
+              <a:rPr lang="en-US" sz="1900" dirty="0">
                 <a:solidFill>
                   <a:srgbClr val="FFFFFF"/>
                 </a:solidFill>
@@ -24409,7 +24747,7 @@
               <a:t> </a:t>
             </a:r>
             <a:r>
-              <a:rPr lang="en-US" sz="1900">
+              <a:rPr lang="en-US" sz="1900" dirty="0" err="1">
                 <a:solidFill>
                   <a:srgbClr val="FFFFFF"/>
                 </a:solidFill>
@@ -24420,6 +24758,31 @@
               </a:rPr>
               <a:t>binary_crossentropy</a:t>
             </a:r>
+            <a:endParaRPr lang="en-US" sz="1900" dirty="0">
+              <a:solidFill>
+                <a:srgbClr val="FFFFFF"/>
+              </a:solidFill>
+              <a:latin typeface="Agrandir"/>
+              <a:ea typeface="Agrandir"/>
+              <a:cs typeface="Agrandir"/>
+              <a:sym typeface="Agrandir"/>
+            </a:endParaRPr>
+          </a:p>
+          <a:p>
+            <a:pPr algn="l">
+              <a:lnSpc>
+                <a:spcPts val="2204"/>
+              </a:lnSpc>
+            </a:pPr>
+            <a:endParaRPr lang="en-US" sz="1900" dirty="0">
+              <a:solidFill>
+                <a:srgbClr val="FFFFFF"/>
+              </a:solidFill>
+              <a:latin typeface="Agrandir Bold"/>
+              <a:ea typeface="Agrandir Bold"/>
+              <a:cs typeface="Agrandir Bold"/>
+              <a:sym typeface="Agrandir Bold"/>
+            </a:endParaRPr>
           </a:p>
           <a:p>
             <a:pPr algn="l">
@@ -24428,7 +24791,7 @@
               </a:lnSpc>
             </a:pPr>
             <a:r>
-              <a:rPr lang="en-US" sz="1900">
+              <a:rPr lang="en-US" sz="1900" dirty="0">
                 <a:solidFill>
                   <a:srgbClr val="FFFFFF"/>
                 </a:solidFill>
@@ -24440,7 +24803,7 @@
               <a:t>Evaluation metrics:</a:t>
             </a:r>
             <a:r>
-              <a:rPr lang="en-US" sz="1900">
+              <a:rPr lang="en-US" sz="1900" dirty="0">
                 <a:solidFill>
                   <a:srgbClr val="FFFFFF"/>
                 </a:solidFill>
@@ -24452,7 +24815,7 @@
               <a:t> </a:t>
             </a:r>
             <a:r>
-              <a:rPr lang="en-US" sz="1900">
+              <a:rPr lang="en-US" sz="1900" dirty="0">
                 <a:solidFill>
                   <a:srgbClr val="FFFFFF"/>
                 </a:solidFill>
@@ -24470,7 +24833,7 @@
                 <a:spcPts val="2204"/>
               </a:lnSpc>
             </a:pPr>
-            <a:endParaRPr lang="en-US" sz="1900">
+            <a:endParaRPr lang="en-US" sz="1900" dirty="0">
               <a:solidFill>
                 <a:srgbClr val="FFFFFF"/>
               </a:solidFill>
@@ -24487,7 +24850,7 @@
               </a:lnSpc>
             </a:pPr>
             <a:r>
-              <a:rPr lang="en-US" sz="1900">
+              <a:rPr lang="en-US" sz="1900" dirty="0" err="1">
                 <a:solidFill>
                   <a:srgbClr val="FFFFFF"/>
                 </a:solidFill>
@@ -24496,10 +24859,22 @@
                 <a:cs typeface="Agrandir Bold"/>
                 <a:sym typeface="Agrandir Bold"/>
               </a:rPr>
-              <a:t>Epocs:</a:t>
+              <a:t>Epocs</a:t>
             </a:r>
             <a:r>
-              <a:rPr lang="en-US" sz="1900">
+              <a:rPr lang="en-US" sz="1900" dirty="0">
+                <a:solidFill>
+                  <a:srgbClr val="FFFFFF"/>
+                </a:solidFill>
+                <a:latin typeface="Agrandir Bold"/>
+                <a:ea typeface="Agrandir Bold"/>
+                <a:cs typeface="Agrandir Bold"/>
+                <a:sym typeface="Agrandir Bold"/>
+              </a:rPr>
+              <a:t>:</a:t>
+            </a:r>
+            <a:r>
+              <a:rPr lang="en-US" sz="1900" dirty="0">
                 <a:solidFill>
                   <a:srgbClr val="FFFFFF"/>
                 </a:solidFill>
@@ -24511,7 +24886,7 @@
               <a:t> </a:t>
             </a:r>
             <a:r>
-              <a:rPr lang="en-US" sz="1900">
+              <a:rPr lang="en-US" sz="1900" dirty="0">
                 <a:solidFill>
                   <a:srgbClr val="FFFFFF"/>
                 </a:solidFill>
@@ -24533,8 +24908,8 @@
         </p:nvSpPr>
         <p:spPr>
           <a:xfrm>
-            <a:off x="6669745" y="9210548"/>
-            <a:ext cx="4948510" cy="333502"/>
+            <a:off x="6660543" y="9794099"/>
+            <a:ext cx="4948510" cy="282129"/>
           </a:xfrm>
           <a:prstGeom prst="rect">
             <a:avLst/>
@@ -24552,7 +24927,7 @@
               </a:lnSpc>
             </a:pPr>
             <a:r>
-              <a:rPr lang="en-US" sz="1900">
+              <a:rPr lang="en-US" sz="1900" dirty="0">
                 <a:solidFill>
                   <a:srgbClr val="156669"/>
                 </a:solidFill>
@@ -24561,7 +24936,7 @@
                 <a:cs typeface="Agrandir"/>
                 <a:sym typeface="Agrandir"/>
               </a:rPr>
-              <a:t>Trainable params: 245 (980.00 B)</a:t>
+              <a:t>Trainable params: 428 (1.67 KB)</a:t>
             </a:r>
           </a:p>
         </p:txBody>
@@ -24574,7 +24949,7 @@
         </p:nvSpPr>
         <p:spPr>
           <a:xfrm>
-            <a:off x="13311589" y="9210548"/>
+            <a:off x="13187138" y="9794099"/>
             <a:ext cx="3761708" cy="333502"/>
           </a:xfrm>
           <a:prstGeom prst="rect">
@@ -24593,7 +24968,7 @@
               </a:lnSpc>
             </a:pPr>
             <a:r>
-              <a:rPr lang="en-US" sz="1900">
+              <a:rPr lang="en-US" sz="1900" dirty="0">
                 <a:solidFill>
                   <a:srgbClr val="156669"/>
                 </a:solidFill>

</xml_diff>